<commit_message>
constraints instead of realism + sparqls
</commit_message>
<xml_diff>
--- a/spqarl_querries/query panels.pptx
+++ b/spqarl_querries/query panels.pptx
@@ -5,12 +5,16 @@
     <p:sldMasterId id="2147483648" r:id="rId1"/>
   </p:sldMasterIdLst>
   <p:notesMasterIdLst>
-    <p:notesMasterId r:id="rId5"/>
+    <p:notesMasterId r:id="rId9"/>
   </p:notesMasterIdLst>
   <p:sldIdLst>
     <p:sldId id="257" r:id="rId2"/>
     <p:sldId id="258" r:id="rId3"/>
     <p:sldId id="259" r:id="rId4"/>
+    <p:sldId id="260" r:id="rId5"/>
+    <p:sldId id="262" r:id="rId6"/>
+    <p:sldId id="261" r:id="rId7"/>
+    <p:sldId id="263" r:id="rId8"/>
   </p:sldIdLst>
   <p:sldSz cx="12192000" cy="6858000"/>
   <p:notesSz cx="6858000" cy="9144000"/>
@@ -199,7 +203,7 @@
           <a:p>
             <a:fld id="{DB543F4F-E7C3-45B2-A732-D09C4A0F1042}" type="datetimeFigureOut">
               <a:rPr lang="fr-FR" smtClean="0"/>
-              <a:t>05/07/2024</a:t>
+              <a:t>08/07/2024</a:t>
             </a:fld>
             <a:endParaRPr lang="fr-FR"/>
           </a:p>
@@ -697,7 +701,7 @@
           <a:p>
             <a:fld id="{17E331FB-B5F4-4144-B7D4-2A36DEDE8382}" type="datetimeFigureOut">
               <a:rPr lang="fr-FR" smtClean="0"/>
-              <a:t>05/07/2024</a:t>
+              <a:t>08/07/2024</a:t>
             </a:fld>
             <a:endParaRPr lang="fr-FR"/>
           </a:p>
@@ -895,7 +899,7 @@
           <a:p>
             <a:fld id="{17E331FB-B5F4-4144-B7D4-2A36DEDE8382}" type="datetimeFigureOut">
               <a:rPr lang="fr-FR" smtClean="0"/>
-              <a:t>05/07/2024</a:t>
+              <a:t>08/07/2024</a:t>
             </a:fld>
             <a:endParaRPr lang="fr-FR"/>
           </a:p>
@@ -1103,7 +1107,7 @@
           <a:p>
             <a:fld id="{17E331FB-B5F4-4144-B7D4-2A36DEDE8382}" type="datetimeFigureOut">
               <a:rPr lang="fr-FR" smtClean="0"/>
-              <a:t>05/07/2024</a:t>
+              <a:t>08/07/2024</a:t>
             </a:fld>
             <a:endParaRPr lang="fr-FR"/>
           </a:p>
@@ -1301,7 +1305,7 @@
           <a:p>
             <a:fld id="{17E331FB-B5F4-4144-B7D4-2A36DEDE8382}" type="datetimeFigureOut">
               <a:rPr lang="fr-FR" smtClean="0"/>
-              <a:t>05/07/2024</a:t>
+              <a:t>08/07/2024</a:t>
             </a:fld>
             <a:endParaRPr lang="fr-FR"/>
           </a:p>
@@ -1576,7 +1580,7 @@
           <a:p>
             <a:fld id="{17E331FB-B5F4-4144-B7D4-2A36DEDE8382}" type="datetimeFigureOut">
               <a:rPr lang="fr-FR" smtClean="0"/>
-              <a:t>05/07/2024</a:t>
+              <a:t>08/07/2024</a:t>
             </a:fld>
             <a:endParaRPr lang="fr-FR"/>
           </a:p>
@@ -1841,7 +1845,7 @@
           <a:p>
             <a:fld id="{17E331FB-B5F4-4144-B7D4-2A36DEDE8382}" type="datetimeFigureOut">
               <a:rPr lang="fr-FR" smtClean="0"/>
-              <a:t>05/07/2024</a:t>
+              <a:t>08/07/2024</a:t>
             </a:fld>
             <a:endParaRPr lang="fr-FR"/>
           </a:p>
@@ -2253,7 +2257,7 @@
           <a:p>
             <a:fld id="{17E331FB-B5F4-4144-B7D4-2A36DEDE8382}" type="datetimeFigureOut">
               <a:rPr lang="fr-FR" smtClean="0"/>
-              <a:t>05/07/2024</a:t>
+              <a:t>08/07/2024</a:t>
             </a:fld>
             <a:endParaRPr lang="fr-FR"/>
           </a:p>
@@ -2394,7 +2398,7 @@
           <a:p>
             <a:fld id="{17E331FB-B5F4-4144-B7D4-2A36DEDE8382}" type="datetimeFigureOut">
               <a:rPr lang="fr-FR" smtClean="0"/>
-              <a:t>05/07/2024</a:t>
+              <a:t>08/07/2024</a:t>
             </a:fld>
             <a:endParaRPr lang="fr-FR"/>
           </a:p>
@@ -2507,7 +2511,7 @@
           <a:p>
             <a:fld id="{17E331FB-B5F4-4144-B7D4-2A36DEDE8382}" type="datetimeFigureOut">
               <a:rPr lang="fr-FR" smtClean="0"/>
-              <a:t>05/07/2024</a:t>
+              <a:t>08/07/2024</a:t>
             </a:fld>
             <a:endParaRPr lang="fr-FR"/>
           </a:p>
@@ -2818,7 +2822,7 @@
           <a:p>
             <a:fld id="{17E331FB-B5F4-4144-B7D4-2A36DEDE8382}" type="datetimeFigureOut">
               <a:rPr lang="fr-FR" smtClean="0"/>
-              <a:t>05/07/2024</a:t>
+              <a:t>08/07/2024</a:t>
             </a:fld>
             <a:endParaRPr lang="fr-FR"/>
           </a:p>
@@ -3106,7 +3110,7 @@
           <a:p>
             <a:fld id="{17E331FB-B5F4-4144-B7D4-2A36DEDE8382}" type="datetimeFigureOut">
               <a:rPr lang="fr-FR" smtClean="0"/>
-              <a:t>05/07/2024</a:t>
+              <a:t>08/07/2024</a:t>
             </a:fld>
             <a:endParaRPr lang="fr-FR"/>
           </a:p>
@@ -3347,7 +3351,7 @@
           <a:p>
             <a:fld id="{17E331FB-B5F4-4144-B7D4-2A36DEDE8382}" type="datetimeFigureOut">
               <a:rPr lang="fr-FR" smtClean="0"/>
-              <a:t>05/07/2024</a:t>
+              <a:t>08/07/2024</a:t>
             </a:fld>
             <a:endParaRPr lang="fr-FR"/>
           </a:p>
@@ -5418,6 +5422,569 @@
     <p:extLst>
       <p:ext uri="{BB962C8B-B14F-4D97-AF65-F5344CB8AC3E}">
         <p14:creationId xmlns:p14="http://schemas.microsoft.com/office/powerpoint/2010/main" val="3572314046"/>
+      </p:ext>
+    </p:extLst>
+  </p:cSld>
+  <p:clrMapOvr>
+    <a:masterClrMapping/>
+  </p:clrMapOvr>
+</p:sld>
+</file>
+
+<file path=ppt/slides/slide4.xml><?xml version="1.0" encoding="utf-8"?>
+<p:sld xmlns:a="http://schemas.openxmlformats.org/drawingml/2006/main" xmlns:r="http://schemas.openxmlformats.org/officeDocument/2006/relationships" xmlns:p="http://schemas.openxmlformats.org/presentationml/2006/main">
+  <p:cSld>
+    <p:spTree>
+      <p:nvGrpSpPr>
+        <p:cNvPr id="1" name=""/>
+        <p:cNvGrpSpPr/>
+        <p:nvPr/>
+      </p:nvGrpSpPr>
+      <p:grpSpPr>
+        <a:xfrm>
+          <a:off x="0" y="0"/>
+          <a:ext cx="0" cy="0"/>
+          <a:chOff x="0" y="0"/>
+          <a:chExt cx="0" cy="0"/>
+        </a:xfrm>
+      </p:grpSpPr>
+      <p:sp>
+        <p:nvSpPr>
+          <p:cNvPr id="2" name="Titre 1">
+            <a:extLst>
+              <a:ext uri="{FF2B5EF4-FFF2-40B4-BE49-F238E27FC236}">
+                <a16:creationId xmlns:a16="http://schemas.microsoft.com/office/drawing/2014/main" id="{A704B4A2-FB17-7D2E-358A-25EAF2C65F69}"/>
+              </a:ext>
+            </a:extLst>
+          </p:cNvPr>
+          <p:cNvSpPr>
+            <a:spLocks noGrp="1"/>
+          </p:cNvSpPr>
+          <p:nvPr>
+            <p:ph type="title"/>
+          </p:nvPr>
+        </p:nvSpPr>
+        <p:spPr/>
+        <p:txBody>
+          <a:bodyPr/>
+          <a:lstStyle/>
+          <a:p>
+            <a:endParaRPr lang="fr-FR"/>
+          </a:p>
+        </p:txBody>
+      </p:sp>
+      <p:sp>
+        <p:nvSpPr>
+          <p:cNvPr id="3" name="Espace réservé du contenu 2">
+            <a:extLst>
+              <a:ext uri="{FF2B5EF4-FFF2-40B4-BE49-F238E27FC236}">
+                <a16:creationId xmlns:a16="http://schemas.microsoft.com/office/drawing/2014/main" id="{BC080B04-60AD-5130-4634-BAE07EB8D20F}"/>
+              </a:ext>
+            </a:extLst>
+          </p:cNvPr>
+          <p:cNvSpPr>
+            <a:spLocks noGrp="1"/>
+          </p:cNvSpPr>
+          <p:nvPr>
+            <p:ph idx="1"/>
+          </p:nvPr>
+        </p:nvSpPr>
+        <p:spPr/>
+        <p:txBody>
+          <a:bodyPr/>
+          <a:lstStyle/>
+          <a:p>
+            <a:endParaRPr lang="fr-FR"/>
+          </a:p>
+        </p:txBody>
+      </p:sp>
+    </p:spTree>
+    <p:extLst>
+      <p:ext uri="{BB962C8B-B14F-4D97-AF65-F5344CB8AC3E}">
+        <p14:creationId xmlns:p14="http://schemas.microsoft.com/office/powerpoint/2010/main" val="162320071"/>
+      </p:ext>
+    </p:extLst>
+  </p:cSld>
+  <p:clrMapOvr>
+    <a:masterClrMapping/>
+  </p:clrMapOvr>
+</p:sld>
+</file>
+
+<file path=ppt/slides/slide5.xml><?xml version="1.0" encoding="utf-8"?>
+<p:sld xmlns:a="http://schemas.openxmlformats.org/drawingml/2006/main" xmlns:r="http://schemas.openxmlformats.org/officeDocument/2006/relationships" xmlns:p="http://schemas.openxmlformats.org/presentationml/2006/main">
+  <p:cSld>
+    <p:spTree>
+      <p:nvGrpSpPr>
+        <p:cNvPr id="1" name=""/>
+        <p:cNvGrpSpPr/>
+        <p:nvPr/>
+      </p:nvGrpSpPr>
+      <p:grpSpPr>
+        <a:xfrm>
+          <a:off x="0" y="0"/>
+          <a:ext cx="0" cy="0"/>
+          <a:chOff x="0" y="0"/>
+          <a:chExt cx="0" cy="0"/>
+        </a:xfrm>
+      </p:grpSpPr>
+      <p:pic>
+        <p:nvPicPr>
+          <p:cNvPr id="5" name="Image 4">
+            <a:extLst>
+              <a:ext uri="{FF2B5EF4-FFF2-40B4-BE49-F238E27FC236}">
+                <a16:creationId xmlns:a16="http://schemas.microsoft.com/office/drawing/2014/main" id="{3178B74E-98F7-D592-3E58-2EFE708ECD29}"/>
+              </a:ext>
+            </a:extLst>
+          </p:cNvPr>
+          <p:cNvPicPr>
+            <a:picLocks noChangeAspect="1"/>
+          </p:cNvPicPr>
+          <p:nvPr/>
+        </p:nvPicPr>
+        <p:blipFill>
+          <a:blip r:embed="rId2"/>
+          <a:stretch>
+            <a:fillRect/>
+          </a:stretch>
+        </p:blipFill>
+        <p:spPr>
+          <a:xfrm>
+            <a:off x="0" y="1251352"/>
+            <a:ext cx="12192000" cy="4100651"/>
+          </a:xfrm>
+          <a:prstGeom prst="rect">
+            <a:avLst/>
+          </a:prstGeom>
+        </p:spPr>
+      </p:pic>
+    </p:spTree>
+    <p:extLst>
+      <p:ext uri="{BB962C8B-B14F-4D97-AF65-F5344CB8AC3E}">
+        <p14:creationId xmlns:p14="http://schemas.microsoft.com/office/powerpoint/2010/main" val="2887041820"/>
+      </p:ext>
+    </p:extLst>
+  </p:cSld>
+  <p:clrMapOvr>
+    <a:masterClrMapping/>
+  </p:clrMapOvr>
+</p:sld>
+</file>
+
+<file path=ppt/slides/slide6.xml><?xml version="1.0" encoding="utf-8"?>
+<p:sld xmlns:a="http://schemas.openxmlformats.org/drawingml/2006/main" xmlns:r="http://schemas.openxmlformats.org/officeDocument/2006/relationships" xmlns:p="http://schemas.openxmlformats.org/presentationml/2006/main">
+  <p:cSld>
+    <p:spTree>
+      <p:nvGrpSpPr>
+        <p:cNvPr id="1" name=""/>
+        <p:cNvGrpSpPr/>
+        <p:nvPr/>
+      </p:nvGrpSpPr>
+      <p:grpSpPr>
+        <a:xfrm>
+          <a:off x="0" y="0"/>
+          <a:ext cx="0" cy="0"/>
+          <a:chOff x="0" y="0"/>
+          <a:chExt cx="0" cy="0"/>
+        </a:xfrm>
+      </p:grpSpPr>
+      <p:pic>
+        <p:nvPicPr>
+          <p:cNvPr id="5" name="Image 4">
+            <a:extLst>
+              <a:ext uri="{FF2B5EF4-FFF2-40B4-BE49-F238E27FC236}">
+                <a16:creationId xmlns:a16="http://schemas.microsoft.com/office/drawing/2014/main" id="{33EA8026-7CBE-3436-8DB3-B1AF22D32856}"/>
+              </a:ext>
+            </a:extLst>
+          </p:cNvPr>
+          <p:cNvPicPr>
+            <a:picLocks noChangeAspect="1"/>
+          </p:cNvPicPr>
+          <p:nvPr/>
+        </p:nvPicPr>
+        <p:blipFill>
+          <a:blip r:embed="rId2"/>
+          <a:stretch>
+            <a:fillRect/>
+          </a:stretch>
+        </p:blipFill>
+        <p:spPr>
+          <a:xfrm>
+            <a:off x="348260" y="65869"/>
+            <a:ext cx="9747318" cy="3610787"/>
+          </a:xfrm>
+          <a:prstGeom prst="rect">
+            <a:avLst/>
+          </a:prstGeom>
+        </p:spPr>
+      </p:pic>
+      <p:pic>
+        <p:nvPicPr>
+          <p:cNvPr id="7" name="Image 6">
+            <a:extLst>
+              <a:ext uri="{FF2B5EF4-FFF2-40B4-BE49-F238E27FC236}">
+                <a16:creationId xmlns:a16="http://schemas.microsoft.com/office/drawing/2014/main" id="{EBEF2741-3945-FE65-44EE-152D261B9208}"/>
+              </a:ext>
+            </a:extLst>
+          </p:cNvPr>
+          <p:cNvPicPr>
+            <a:picLocks noChangeAspect="1"/>
+          </p:cNvPicPr>
+          <p:nvPr/>
+        </p:nvPicPr>
+        <p:blipFill>
+          <a:blip r:embed="rId3"/>
+          <a:stretch>
+            <a:fillRect/>
+          </a:stretch>
+        </p:blipFill>
+        <p:spPr>
+          <a:xfrm>
+            <a:off x="2256050" y="1772193"/>
+            <a:ext cx="5250006" cy="4351032"/>
+          </a:xfrm>
+          <a:prstGeom prst="rect">
+            <a:avLst/>
+          </a:prstGeom>
+        </p:spPr>
+      </p:pic>
+      <p:grpSp>
+        <p:nvGrpSpPr>
+          <p:cNvPr id="19" name="Groupe 18">
+            <a:extLst>
+              <a:ext uri="{FF2B5EF4-FFF2-40B4-BE49-F238E27FC236}">
+                <a16:creationId xmlns:a16="http://schemas.microsoft.com/office/drawing/2014/main" id="{870C0901-5A66-43BD-4279-5A488CAC28FE}"/>
+              </a:ext>
+            </a:extLst>
+          </p:cNvPr>
+          <p:cNvGrpSpPr/>
+          <p:nvPr/>
+        </p:nvGrpSpPr>
+        <p:grpSpPr>
+          <a:xfrm>
+            <a:off x="282036" y="4772560"/>
+            <a:ext cx="4390655" cy="2256746"/>
+            <a:chOff x="5981710" y="167609"/>
+            <a:chExt cx="4390655" cy="2256746"/>
+          </a:xfrm>
+        </p:grpSpPr>
+        <p:grpSp>
+          <p:nvGrpSpPr>
+            <p:cNvPr id="13" name="Groupe 12">
+              <a:extLst>
+                <a:ext uri="{FF2B5EF4-FFF2-40B4-BE49-F238E27FC236}">
+                  <a16:creationId xmlns:a16="http://schemas.microsoft.com/office/drawing/2014/main" id="{7F0C7FC6-C581-1B2E-C14A-3609177DF7B9}"/>
+                </a:ext>
+              </a:extLst>
+            </p:cNvPr>
+            <p:cNvGrpSpPr>
+              <a:grpSpLocks noChangeAspect="1"/>
+            </p:cNvGrpSpPr>
+            <p:nvPr/>
+          </p:nvGrpSpPr>
+          <p:grpSpPr>
+            <a:xfrm>
+              <a:off x="5981710" y="167609"/>
+              <a:ext cx="4186656" cy="2256746"/>
+              <a:chOff x="6317012" y="167608"/>
+              <a:chExt cx="4509873" cy="2430971"/>
+            </a:xfrm>
+          </p:grpSpPr>
+          <p:grpSp>
+            <p:nvGrpSpPr>
+              <p:cNvPr id="14" name="Groupe 13">
+                <a:extLst>
+                  <a:ext uri="{FF2B5EF4-FFF2-40B4-BE49-F238E27FC236}">
+                    <a16:creationId xmlns:a16="http://schemas.microsoft.com/office/drawing/2014/main" id="{902A1BA5-AA32-F763-5C60-FED7430DF97F}"/>
+                  </a:ext>
+                </a:extLst>
+              </p:cNvPr>
+              <p:cNvGrpSpPr/>
+              <p:nvPr/>
+            </p:nvGrpSpPr>
+            <p:grpSpPr>
+              <a:xfrm>
+                <a:off x="6317013" y="167608"/>
+                <a:ext cx="4418521" cy="2376242"/>
+                <a:chOff x="5630676" y="1"/>
+                <a:chExt cx="4418521" cy="2376242"/>
+              </a:xfrm>
+            </p:grpSpPr>
+            <p:pic>
+              <p:nvPicPr>
+                <p:cNvPr id="16" name="Image 15">
+                  <a:extLst>
+                    <a:ext uri="{FF2B5EF4-FFF2-40B4-BE49-F238E27FC236}">
+                      <a16:creationId xmlns:a16="http://schemas.microsoft.com/office/drawing/2014/main" id="{9924B144-F44E-C685-3295-414BF6B443E9}"/>
+                    </a:ext>
+                  </a:extLst>
+                </p:cNvPr>
+                <p:cNvPicPr>
+                  <a:picLocks noChangeAspect="1"/>
+                </p:cNvPicPr>
+                <p:nvPr/>
+              </p:nvPicPr>
+              <p:blipFill rotWithShape="1">
+                <a:blip r:embed="rId4"/>
+                <a:srcRect b="67404"/>
+                <a:stretch/>
+              </p:blipFill>
+              <p:spPr>
+                <a:xfrm>
+                  <a:off x="5702012" y="1"/>
+                  <a:ext cx="4347185" cy="1040860"/>
+                </a:xfrm>
+                <a:prstGeom prst="rect">
+                  <a:avLst/>
+                </a:prstGeom>
+              </p:spPr>
+            </p:pic>
+            <p:pic>
+              <p:nvPicPr>
+                <p:cNvPr id="17" name="Image 16">
+                  <a:extLst>
+                    <a:ext uri="{FF2B5EF4-FFF2-40B4-BE49-F238E27FC236}">
+                      <a16:creationId xmlns:a16="http://schemas.microsoft.com/office/drawing/2014/main" id="{CEE16C50-C7C6-15D5-CBD6-41E62A4A8E2A}"/>
+                    </a:ext>
+                  </a:extLst>
+                </p:cNvPr>
+                <p:cNvPicPr>
+                  <a:picLocks noChangeAspect="1"/>
+                </p:cNvPicPr>
+                <p:nvPr/>
+              </p:nvPicPr>
+              <p:blipFill rotWithShape="1">
+                <a:blip r:embed="rId4"/>
+                <a:srcRect t="56340" b="1840"/>
+                <a:stretch/>
+              </p:blipFill>
+              <p:spPr>
+                <a:xfrm>
+                  <a:off x="5630676" y="1040861"/>
+                  <a:ext cx="4347185" cy="1335382"/>
+                </a:xfrm>
+                <a:prstGeom prst="rect">
+                  <a:avLst/>
+                </a:prstGeom>
+              </p:spPr>
+            </p:pic>
+          </p:grpSp>
+          <p:sp>
+            <p:nvSpPr>
+              <p:cNvPr id="15" name="Rectangle 14">
+                <a:extLst>
+                  <a:ext uri="{FF2B5EF4-FFF2-40B4-BE49-F238E27FC236}">
+                    <a16:creationId xmlns:a16="http://schemas.microsoft.com/office/drawing/2014/main" id="{D087325A-06F3-3DBA-E111-11DB5655EE21}"/>
+                  </a:ext>
+                </a:extLst>
+              </p:cNvPr>
+              <p:cNvSpPr/>
+              <p:nvPr/>
+            </p:nvSpPr>
+            <p:spPr>
+              <a:xfrm>
+                <a:off x="6317012" y="167608"/>
+                <a:ext cx="4509873" cy="2430971"/>
+              </a:xfrm>
+              <a:prstGeom prst="rect">
+                <a:avLst/>
+              </a:prstGeom>
+              <a:noFill/>
+              <a:ln w="9525">
+                <a:solidFill>
+                  <a:schemeClr val="tx1"/>
+                </a:solidFill>
+              </a:ln>
+            </p:spPr>
+            <p:style>
+              <a:lnRef idx="2">
+                <a:schemeClr val="accent1">
+                  <a:shade val="15000"/>
+                </a:schemeClr>
+              </a:lnRef>
+              <a:fillRef idx="1">
+                <a:schemeClr val="accent1"/>
+              </a:fillRef>
+              <a:effectRef idx="0">
+                <a:schemeClr val="accent1"/>
+              </a:effectRef>
+              <a:fontRef idx="minor">
+                <a:schemeClr val="lt1"/>
+              </a:fontRef>
+            </p:style>
+            <p:txBody>
+              <a:bodyPr rtlCol="0" anchor="ctr"/>
+              <a:lstStyle/>
+              <a:p>
+                <a:pPr algn="ctr"/>
+                <a:endParaRPr lang="fr-FR"/>
+              </a:p>
+            </p:txBody>
+          </p:sp>
+        </p:grpSp>
+        <p:sp>
+          <p:nvSpPr>
+            <p:cNvPr id="18" name="ZoneTexte 17">
+              <a:extLst>
+                <a:ext uri="{FF2B5EF4-FFF2-40B4-BE49-F238E27FC236}">
+                  <a16:creationId xmlns:a16="http://schemas.microsoft.com/office/drawing/2014/main" id="{0E89EE30-A8D9-47F3-F678-AECCB0A9CCDA}"/>
+                </a:ext>
+              </a:extLst>
+            </p:cNvPr>
+            <p:cNvSpPr txBox="1"/>
+            <p:nvPr/>
+          </p:nvSpPr>
+          <p:spPr>
+            <a:xfrm>
+              <a:off x="9633063" y="259357"/>
+              <a:ext cx="739302" cy="369332"/>
+            </a:xfrm>
+            <a:prstGeom prst="rect">
+              <a:avLst/>
+            </a:prstGeom>
+            <a:noFill/>
+          </p:spPr>
+          <p:txBody>
+            <a:bodyPr wrap="square" rtlCol="0">
+              <a:spAutoFit/>
+            </a:bodyPr>
+            <a:lstStyle/>
+            <a:p>
+              <a:r>
+                <a:rPr lang="fr-FR" b="1" dirty="0">
+                  <a:latin typeface="Arial" panose="020B0604020202020204" pitchFamily="34" charset="0"/>
+                  <a:cs typeface="Arial" panose="020B0604020202020204" pitchFamily="34" charset="0"/>
+                </a:rPr>
+                <a:t>B</a:t>
+              </a:r>
+            </a:p>
+          </p:txBody>
+        </p:sp>
+      </p:grpSp>
+      <p:pic>
+        <p:nvPicPr>
+          <p:cNvPr id="21" name="Image 20">
+            <a:extLst>
+              <a:ext uri="{FF2B5EF4-FFF2-40B4-BE49-F238E27FC236}">
+                <a16:creationId xmlns:a16="http://schemas.microsoft.com/office/drawing/2014/main" id="{CD27E854-1F40-127E-6E52-43BA7C92EBA2}"/>
+              </a:ext>
+            </a:extLst>
+          </p:cNvPr>
+          <p:cNvPicPr>
+            <a:picLocks noChangeAspect="1"/>
+          </p:cNvPicPr>
+          <p:nvPr/>
+        </p:nvPicPr>
+        <p:blipFill>
+          <a:blip r:embed="rId5"/>
+          <a:stretch>
+            <a:fillRect/>
+          </a:stretch>
+        </p:blipFill>
+        <p:spPr>
+          <a:xfrm>
+            <a:off x="6801178" y="2027932"/>
+            <a:ext cx="3999279" cy="4718685"/>
+          </a:xfrm>
+          <a:prstGeom prst="rect">
+            <a:avLst/>
+          </a:prstGeom>
+        </p:spPr>
+      </p:pic>
+    </p:spTree>
+    <p:extLst>
+      <p:ext uri="{BB962C8B-B14F-4D97-AF65-F5344CB8AC3E}">
+        <p14:creationId xmlns:p14="http://schemas.microsoft.com/office/powerpoint/2010/main" val="2390560806"/>
+      </p:ext>
+    </p:extLst>
+  </p:cSld>
+  <p:clrMapOvr>
+    <a:masterClrMapping/>
+  </p:clrMapOvr>
+</p:sld>
+</file>
+
+<file path=ppt/slides/slide7.xml><?xml version="1.0" encoding="utf-8"?>
+<p:sld xmlns:a="http://schemas.openxmlformats.org/drawingml/2006/main" xmlns:r="http://schemas.openxmlformats.org/officeDocument/2006/relationships" xmlns:p="http://schemas.openxmlformats.org/presentationml/2006/main">
+  <p:cSld>
+    <p:spTree>
+      <p:nvGrpSpPr>
+        <p:cNvPr id="1" name=""/>
+        <p:cNvGrpSpPr/>
+        <p:nvPr/>
+      </p:nvGrpSpPr>
+      <p:grpSpPr>
+        <a:xfrm>
+          <a:off x="0" y="0"/>
+          <a:ext cx="0" cy="0"/>
+          <a:chOff x="0" y="0"/>
+          <a:chExt cx="0" cy="0"/>
+        </a:xfrm>
+      </p:grpSpPr>
+      <p:pic>
+        <p:nvPicPr>
+          <p:cNvPr id="5" name="Image 4">
+            <a:extLst>
+              <a:ext uri="{FF2B5EF4-FFF2-40B4-BE49-F238E27FC236}">
+                <a16:creationId xmlns:a16="http://schemas.microsoft.com/office/drawing/2014/main" id="{F1B9E148-5766-FD11-B6BA-7821C6D98F09}"/>
+              </a:ext>
+            </a:extLst>
+          </p:cNvPr>
+          <p:cNvPicPr>
+            <a:picLocks noChangeAspect="1"/>
+          </p:cNvPicPr>
+          <p:nvPr/>
+        </p:nvPicPr>
+        <p:blipFill>
+          <a:blip r:embed="rId2"/>
+          <a:stretch>
+            <a:fillRect/>
+          </a:stretch>
+        </p:blipFill>
+        <p:spPr>
+          <a:xfrm>
+            <a:off x="826927" y="1271587"/>
+            <a:ext cx="7667625" cy="4314825"/>
+          </a:xfrm>
+          <a:prstGeom prst="rect">
+            <a:avLst/>
+          </a:prstGeom>
+        </p:spPr>
+      </p:pic>
+      <p:pic>
+        <p:nvPicPr>
+          <p:cNvPr id="7" name="Image 6">
+            <a:extLst>
+              <a:ext uri="{FF2B5EF4-FFF2-40B4-BE49-F238E27FC236}">
+                <a16:creationId xmlns:a16="http://schemas.microsoft.com/office/drawing/2014/main" id="{1D99FE63-8022-2C73-49F9-F87BA012F4B7}"/>
+              </a:ext>
+            </a:extLst>
+          </p:cNvPr>
+          <p:cNvPicPr>
+            <a:picLocks noChangeAspect="1"/>
+          </p:cNvPicPr>
+          <p:nvPr/>
+        </p:nvPicPr>
+        <p:blipFill>
+          <a:blip r:embed="rId3"/>
+          <a:stretch>
+            <a:fillRect/>
+          </a:stretch>
+        </p:blipFill>
+        <p:spPr>
+          <a:xfrm>
+            <a:off x="4216320" y="1538112"/>
+            <a:ext cx="7254191" cy="4396747"/>
+          </a:xfrm>
+          <a:prstGeom prst="rect">
+            <a:avLst/>
+          </a:prstGeom>
+        </p:spPr>
+      </p:pic>
+    </p:spTree>
+    <p:extLst>
+      <p:ext uri="{BB962C8B-B14F-4D97-AF65-F5344CB8AC3E}">
+        <p14:creationId xmlns:p14="http://schemas.microsoft.com/office/powerpoint/2010/main" val="1158192922"/>
       </p:ext>
     </p:extLst>
   </p:cSld>

</xml_diff>